<commit_message>
update tags and videos
</commit_message>
<xml_diff>
--- a/DetectTrafficSign_Slides_LyKiet.pptx
+++ b/DetectTrafficSign_Slides_LyKiet.pptx
@@ -838,7 +838,7 @@
           </a:ln>
           <a:extLst>
             <a:ext uri="{909E8E84-426E-40dd-AFC4-6F175D3DCCD1}">
-              <a14:hiddenFill xmlns="" xmlns:a14="http://schemas.microsoft.com/office/drawing/2010/main">
+              <a14:hiddenFill xmlns:a14="http://schemas.microsoft.com/office/drawing/2010/main" xmlns="">
                 <a:solidFill>
                   <a:srgbClr val="FFFFFF"/>
                 </a:solidFill>
@@ -861,14 +861,14 @@
           <a:noFill/>
           <a:extLst>
             <a:ext uri="{909E8E84-426E-40dd-AFC4-6F175D3DCCD1}">
-              <a14:hiddenFill xmlns="" xmlns:a14="http://schemas.microsoft.com/office/drawing/2010/main">
+              <a14:hiddenFill xmlns:a14="http://schemas.microsoft.com/office/drawing/2010/main" xmlns="">
                 <a:solidFill>
                   <a:srgbClr val="FFFFFF"/>
                 </a:solidFill>
               </a14:hiddenFill>
             </a:ext>
             <a:ext uri="{91240B29-F687-4f45-9708-019B960494DF}">
-              <a14:hiddenLine xmlns="" xmlns:a14="http://schemas.microsoft.com/office/drawing/2010/main" w="9525">
+              <a14:hiddenLine xmlns:a14="http://schemas.microsoft.com/office/drawing/2010/main" xmlns="" w="9525">
                 <a:solidFill>
                   <a:srgbClr val="000000"/>
                 </a:solidFill>
@@ -4295,14 +4295,14 @@
           </a:ln>
           <a:extLst>
             <a:ext uri="{909E8E84-426E-40dd-AFC4-6F175D3DCCD1}">
-              <a14:hiddenFill xmlns="" xmlns:a14="http://schemas.microsoft.com/office/drawing/2010/main">
+              <a14:hiddenFill xmlns:a14="http://schemas.microsoft.com/office/drawing/2010/main" xmlns="">
                 <a:solidFill>
                   <a:srgbClr val="FFFFFF"/>
                 </a:solidFill>
               </a14:hiddenFill>
             </a:ext>
             <a:ext uri="{91240B29-F687-4f45-9708-019B960494DF}">
-              <a14:hiddenLine xmlns="" xmlns:a14="http://schemas.microsoft.com/office/drawing/2010/main" w="9525">
+              <a14:hiddenLine xmlns:a14="http://schemas.microsoft.com/office/drawing/2010/main" xmlns="" w="9525">
                 <a:solidFill>
                   <a:srgbClr val="000000"/>
                 </a:solidFill>
@@ -4353,14 +4353,14 @@
           </a:ln>
           <a:extLst>
             <a:ext uri="{909E8E84-426E-40dd-AFC4-6F175D3DCCD1}">
-              <a14:hiddenFill xmlns="" xmlns:a14="http://schemas.microsoft.com/office/drawing/2010/main">
+              <a14:hiddenFill xmlns:a14="http://schemas.microsoft.com/office/drawing/2010/main" xmlns="">
                 <a:solidFill>
                   <a:srgbClr val="FFFFFF"/>
                 </a:solidFill>
               </a14:hiddenFill>
             </a:ext>
             <a:ext uri="{91240B29-F687-4f45-9708-019B960494DF}">
-              <a14:hiddenLine xmlns="" xmlns:a14="http://schemas.microsoft.com/office/drawing/2010/main" w="9525">
+              <a14:hiddenLine xmlns:a14="http://schemas.microsoft.com/office/drawing/2010/main" xmlns="" w="9525">
                 <a:solidFill>
                   <a:srgbClr val="000000"/>
                 </a:solidFill>
@@ -5145,14 +5145,14 @@
           <a:noFill/>
           <a:extLst>
             <a:ext uri="{909E8E84-426E-40dd-AFC4-6F175D3DCCD1}">
-              <a14:hiddenFill xmlns="" xmlns:a14="http://schemas.microsoft.com/office/drawing/2010/main">
+              <a14:hiddenFill xmlns:a14="http://schemas.microsoft.com/office/drawing/2010/main" xmlns="">
                 <a:solidFill>
                   <a:srgbClr val="FFFFFF"/>
                 </a:solidFill>
               </a14:hiddenFill>
             </a:ext>
             <a:ext uri="{91240B29-F687-4f45-9708-019B960494DF}">
-              <a14:hiddenLine xmlns="" xmlns:a14="http://schemas.microsoft.com/office/drawing/2010/main" w="9525">
+              <a14:hiddenLine xmlns:a14="http://schemas.microsoft.com/office/drawing/2010/main" xmlns="" w="9525">
                 <a:solidFill>
                   <a:srgbClr val="000000"/>
                 </a:solidFill>
@@ -5360,14 +5360,14 @@
           </a:ln>
           <a:extLst>
             <a:ext uri="{909E8E84-426E-40dd-AFC4-6F175D3DCCD1}">
-              <a14:hiddenFill xmlns="" xmlns:a14="http://schemas.microsoft.com/office/drawing/2010/main">
+              <a14:hiddenFill xmlns:a14="http://schemas.microsoft.com/office/drawing/2010/main" xmlns="">
                 <a:solidFill>
                   <a:srgbClr val="FFFFFF"/>
                 </a:solidFill>
               </a14:hiddenFill>
             </a:ext>
             <a:ext uri="{91240B29-F687-4f45-9708-019B960494DF}">
-              <a14:hiddenLine xmlns="" xmlns:a14="http://schemas.microsoft.com/office/drawing/2010/main" w="9525">
+              <a14:hiddenLine xmlns:a14="http://schemas.microsoft.com/office/drawing/2010/main" xmlns="" w="9525">
                 <a:solidFill>
                   <a:srgbClr val="000000"/>
                 </a:solidFill>
@@ -5609,25 +5609,12 @@
               <a:rPr lang="en-US" dirty="0" smtClean="0">
                 <a:hlinkClick r:id="rId2"/>
               </a:rPr>
-              <a:t>https://</a:t>
-            </a:r>
-            <a:r>
-              <a:rPr lang="en-US" dirty="0" smtClean="0">
-                <a:hlinkClick r:id="rId2"/>
-              </a:rPr>
-              <a:t>github.com/kietly</a:t>
-            </a:r>
-            <a:r>
-              <a:rPr lang="en-US" dirty="0" smtClean="0">
-                <a:hlinkClick r:id="rId2"/>
-              </a:rPr>
-              <a:t>/self-driving</a:t>
+              <a:t>https://github.com/kietly/self-driving</a:t>
             </a:r>
             <a:r>
               <a:rPr lang="en-US" dirty="0" smtClean="0"/>
               <a:t>-car</a:t>
             </a:r>
-            <a:endParaRPr lang="en-US" dirty="0" smtClean="0"/>
           </a:p>
           <a:p>
             <a:r>
@@ -5638,11 +5625,7 @@
           <a:p>
             <a:r>
               <a:rPr lang="en-US" dirty="0" smtClean="0"/>
-              <a:t>Stop sign data was copy from references [6</a:t>
-            </a:r>
-            <a:r>
-              <a:rPr lang="en-US" dirty="0" smtClean="0"/>
-              <a:t>].</a:t>
+              <a:t>Stop sign data was copy from references [6].</a:t>
             </a:r>
           </a:p>
           <a:p>
@@ -5691,13 +5674,8 @@
           <a:p>
             <a:r>
               <a:rPr lang="en-US" dirty="0" smtClean="0"/>
-              <a:t>Type </a:t>
-            </a:r>
-            <a:r>
-              <a:rPr lang="en-US" smtClean="0"/>
-              <a:t>$make</a:t>
-            </a:r>
-            <a:endParaRPr lang="en-US" dirty="0" smtClean="0"/>
+              <a:t>Type $make</a:t>
+            </a:r>
           </a:p>
         </p:txBody>
       </p:sp>
@@ -7244,11 +7222,7 @@
             </a:r>
             <a:r>
               <a:rPr lang="en-US" dirty="0" smtClean="0"/>
-              <a:t>darknet19_448.conv.23 pre-trained weight </a:t>
-            </a:r>
-            <a:r>
-              <a:rPr lang="en-US" dirty="0" smtClean="0"/>
-              <a:t>file </a:t>
+              <a:t>darknet19_448.conv.23 pre-trained weight file </a:t>
             </a:r>
             <a:r>
               <a:rPr lang="en-US" u="sng" dirty="0">
@@ -7258,11 +7232,7 @@
             </a:r>
             <a:r>
               <a:rPr lang="en-US" dirty="0" smtClean="0"/>
-              <a:t>. I already downloaded it for you. </a:t>
-            </a:r>
-            <a:r>
-              <a:rPr lang="en-US" dirty="0" smtClean="0"/>
-              <a:t>We start the training with pre-trained weights from </a:t>
+              <a:t>. I already downloaded it for you. We start the training with pre-trained weights from </a:t>
             </a:r>
             <a:r>
               <a:rPr lang="en-US" dirty="0" err="1" smtClean="0"/>
@@ -7282,6 +7252,33 @@
               <a:rPr lang="en-US" dirty="0" smtClean="0"/>
               <a:t>Training on the stop sign dataset to get the training weights. </a:t>
             </a:r>
+            <a:r>
+              <a:rPr lang="en-US" dirty="0" smtClean="0"/>
+              <a:t>Note if you cloned from </a:t>
+            </a:r>
+            <a:r>
+              <a:rPr lang="en-US" dirty="0" smtClean="0">
+                <a:hlinkClick r:id="rId3"/>
+              </a:rPr>
+              <a:t>https://github.com/kietly/self-driving-car</a:t>
+            </a:r>
+            <a:r>
+              <a:rPr lang="en-US" dirty="0" smtClean="0"/>
+              <a:t> you must perform this step. The weight file size is &gt; 100 MB and not allow to </a:t>
+            </a:r>
+            <a:r>
+              <a:rPr lang="en-US" dirty="0" smtClean="0"/>
+              <a:t>check in </a:t>
+            </a:r>
+            <a:r>
+              <a:rPr lang="en-US" dirty="0" err="1" smtClean="0"/>
+              <a:t>github</a:t>
+            </a:r>
+            <a:r>
+              <a:rPr lang="en-US" dirty="0" smtClean="0"/>
+              <a:t>. Here is the command to train.</a:t>
+            </a:r>
+            <a:endParaRPr lang="en-US" dirty="0" smtClean="0"/>
           </a:p>
           <a:p>
             <a:pPr lvl="1"/>
@@ -7326,8 +7323,13 @@
           <a:p>
             <a:r>
               <a:rPr lang="en-US" dirty="0" smtClean="0"/>
-              <a:t>Stop the training when the average accuracy &lt;= 0.06</a:t>
-            </a:r>
+              <a:t>Stop the training when the average accuracy &lt;= </a:t>
+            </a:r>
+            <a:r>
+              <a:rPr lang="en-US" dirty="0" smtClean="0"/>
+              <a:t>0.06. It took about 30 mins for p2.xlarge to reach this point.</a:t>
+            </a:r>
+            <a:endParaRPr lang="en-US" dirty="0" smtClean="0"/>
           </a:p>
           <a:p>
             <a:r>
@@ -7408,14 +7410,14 @@
           <p:nvPr/>
         </p:nvPicPr>
         <p:blipFill>
-          <a:blip r:embed="rId3"/>
+          <a:blip r:embed="rId4"/>
           <a:stretch>
             <a:fillRect/>
           </a:stretch>
         </p:blipFill>
         <p:spPr>
           <a:xfrm>
-            <a:off x="914400" y="3733800"/>
+            <a:off x="762000" y="4797425"/>
             <a:ext cx="2679700" cy="1003300"/>
           </a:xfrm>
           <a:prstGeom prst="rect">
@@ -8366,14 +8368,14 @@
           <a:noFill/>
           <a:extLst>
             <a:ext uri="{909E8E84-426E-40dd-AFC4-6F175D3DCCD1}">
-              <a14:hiddenFill xmlns="" xmlns:a14="http://schemas.microsoft.com/office/drawing/2010/main">
+              <a14:hiddenFill xmlns:a14="http://schemas.microsoft.com/office/drawing/2010/main" xmlns="">
                 <a:solidFill>
                   <a:srgbClr val="FFFFFF"/>
                 </a:solidFill>
               </a14:hiddenFill>
             </a:ext>
             <a:ext uri="{91240B29-F687-4f45-9708-019B960494DF}">
-              <a14:hiddenLine xmlns="" xmlns:a14="http://schemas.microsoft.com/office/drawing/2010/main" w="9525">
+              <a14:hiddenLine xmlns:a14="http://schemas.microsoft.com/office/drawing/2010/main" xmlns="" w="9525">
                 <a:solidFill>
                   <a:srgbClr val="000000"/>
                 </a:solidFill>
@@ -8657,7 +8659,7 @@
         <p:spPr>
           <a:xfrm>
             <a:off x="2743200" y="1341398"/>
-            <a:ext cx="3313728" cy="369332"/>
+            <a:ext cx="3454792" cy="369332"/>
           </a:xfrm>
           <a:prstGeom prst="rect">
             <a:avLst/>
@@ -8699,17 +8701,12 @@
           <a:lstStyle/>
           <a:p>
             <a:r>
-              <a:rPr lang="en-US" dirty="0"/>
-              <a:t>https://</a:t>
-            </a:r>
-            <a:r>
-              <a:rPr lang="en-US" dirty="0" err="1"/>
-              <a:t>youtu.be</a:t>
-            </a:r>
-            <a:r>
-              <a:rPr lang="en-US" dirty="0"/>
-              <a:t>/UJocvtM0dww</a:t>
-            </a:r>
+              <a:rPr lang="en-US" dirty="0">
+                <a:hlinkClick r:id="rId2"/>
+              </a:rPr>
+              <a:t>https://youtu.be/AM5LwgdFsW4</a:t>
+            </a:r>
+            <a:endParaRPr lang="en-US" dirty="0"/>
           </a:p>
         </p:txBody>
       </p:sp>
@@ -8976,6 +8973,30 @@
               </a:rPr>
               <a:t>leonardoaraujosantos.gitbooks.io/artificial-inteligence/content/single-shot-detectors/yolo.html</a:t>
             </a:r>
+            <a:endParaRPr lang="en-US" dirty="0" smtClean="0"/>
+          </a:p>
+          <a:p>
+            <a:pPr>
+              <a:buFont typeface="+mj-lt"/>
+              <a:buAutoNum type="arabicPeriod"/>
+            </a:pPr>
+            <a:r>
+              <a:rPr lang="en-US" dirty="0" smtClean="0"/>
+              <a:t>The codes and images use for this project, </a:t>
+            </a:r>
+            <a:r>
+              <a:rPr lang="en-US" dirty="0" smtClean="0">
+                <a:hlinkClick r:id="rId9"/>
+              </a:rPr>
+              <a:t>https://github.com/kietly/self-driving-car</a:t>
+            </a:r>
+            <a:endParaRPr lang="en-US" dirty="0" smtClean="0"/>
+          </a:p>
+          <a:p>
+            <a:pPr>
+              <a:buFont typeface="+mj-lt"/>
+              <a:buAutoNum type="arabicPeriod"/>
+            </a:pPr>
             <a:endParaRPr lang="en-US" dirty="0" smtClean="0"/>
           </a:p>
           <a:p>
@@ -9199,14 +9220,14 @@
           <a:noFill/>
           <a:extLst>
             <a:ext uri="{909E8E84-426E-40dd-AFC4-6F175D3DCCD1}">
-              <a14:hiddenFill xmlns="" xmlns:a14="http://schemas.microsoft.com/office/drawing/2010/main">
+              <a14:hiddenFill xmlns:a14="http://schemas.microsoft.com/office/drawing/2010/main" xmlns="">
                 <a:solidFill>
                   <a:srgbClr val="FFFFFF"/>
                 </a:solidFill>
               </a14:hiddenFill>
             </a:ext>
             <a:ext uri="{91240B29-F687-4f45-9708-019B960494DF}">
-              <a14:hiddenLine xmlns="" xmlns:a14="http://schemas.microsoft.com/office/drawing/2010/main" w="9525">
+              <a14:hiddenLine xmlns:a14="http://schemas.microsoft.com/office/drawing/2010/main" xmlns="" w="9525">
                 <a:solidFill>
                   <a:srgbClr val="000000"/>
                 </a:solidFill>
@@ -9503,7 +9524,7 @@
           <a:graphicData uri="http://schemas.openxmlformats.org/presentationml/2006/ole">
             <mc:AlternateContent xmlns:mc="http://schemas.openxmlformats.org/markup-compatibility/2006">
               <mc:Choice xmlns:v="urn:schemas-microsoft-com:vml" Requires="v">
-                <p:oleObj spid="_x0000_s1067" r:id="rId3" imgW="7239000" imgH="5702300" progId="Visio.Drawing.15">
+                <p:oleObj spid="_x0000_s1072" r:id="rId3" imgW="7239000" imgH="5702300" progId="Visio.Drawing.15">
                   <p:embed/>
                 </p:oleObj>
               </mc:Choice>
@@ -10880,7 +10901,7 @@
         <p:spPr>
           <a:xfrm>
             <a:off x="457200" y="754063"/>
-            <a:ext cx="4953000" cy="381000"/>
+            <a:ext cx="8382000" cy="381000"/>
           </a:xfrm>
         </p:spPr>
         <p:txBody>
@@ -10892,12 +10913,28 @@
               <a:t>See </a:t>
             </a:r>
             <a:r>
+              <a:rPr lang="en-US" dirty="0" smtClean="0"/>
+              <a:t>https://</a:t>
+            </a:r>
+            <a:r>
               <a:rPr lang="en-US" dirty="0" err="1" smtClean="0"/>
-              <a:t>LyKiet_DetectTrafficSign.zip</a:t>
-            </a:r>
-            <a:r>
-              <a:rPr lang="en-US" dirty="0" smtClean="0"/>
-              <a:t>/ec2.p2.xlarge/</a:t>
+              <a:t>github.com</a:t>
+            </a:r>
+            <a:r>
+              <a:rPr lang="en-US" dirty="0" smtClean="0"/>
+              <a:t>/</a:t>
+            </a:r>
+            <a:r>
+              <a:rPr lang="en-US" dirty="0" err="1" smtClean="0"/>
+              <a:t>kietly</a:t>
+            </a:r>
+            <a:r>
+              <a:rPr lang="en-US" dirty="0" smtClean="0"/>
+              <a:t>/self-driving-car</a:t>
+            </a:r>
+            <a:r>
+              <a:rPr lang="en-US" dirty="0" smtClean="0"/>
+              <a:t>/ec2.p2.xlarge/  </a:t>
             </a:r>
             <a:endParaRPr lang="en-US" dirty="0"/>
           </a:p>
@@ -10974,8 +11011,8 @@
         </p:blipFill>
         <p:spPr>
           <a:xfrm>
-            <a:off x="381000" y="1097708"/>
-            <a:ext cx="3486449" cy="5652902"/>
+            <a:off x="381000" y="1304365"/>
+            <a:ext cx="3486449" cy="5553635"/>
           </a:xfrm>
           <a:prstGeom prst="rect">
             <a:avLst/>
@@ -10991,7 +11028,7 @@
         <p:spPr>
           <a:xfrm>
             <a:off x="4034118" y="1304365"/>
-            <a:ext cx="4652682" cy="2000548"/>
+            <a:ext cx="4805082" cy="2292935"/>
           </a:xfrm>
           <a:prstGeom prst="rect">
             <a:avLst/>
@@ -11005,7 +11042,7 @@
           <a:lstStyle/>
           <a:p>
             <a:r>
-              <a:rPr lang="en-US" sz="1400" dirty="0" smtClean="0"/>
+              <a:rPr lang="en-US" sz="1200" dirty="0" smtClean="0"/>
               <a:t>Key attributes:</a:t>
             </a:r>
           </a:p>
@@ -11015,11 +11052,11 @@
               <a:buChar char="•"/>
             </a:pPr>
             <a:r>
-              <a:rPr lang="en-US" sz="1100" dirty="0" err="1" smtClean="0"/>
+              <a:rPr lang="en-US" sz="1200" dirty="0" err="1" smtClean="0"/>
               <a:t>SpotPrice</a:t>
             </a:r>
             <a:r>
-              <a:rPr lang="en-US" sz="1100" dirty="0" smtClean="0"/>
+              <a:rPr lang="en-US" sz="1200" dirty="0" smtClean="0"/>
               <a:t>: “on demand price”. P2.xlarge on demand is $0.90 </a:t>
             </a:r>
           </a:p>
@@ -11029,11 +11066,11 @@
               <a:buChar char="•"/>
             </a:pPr>
             <a:r>
-              <a:rPr lang="en-US" sz="1100" dirty="0" err="1" smtClean="0"/>
+              <a:rPr lang="en-US" sz="1200" dirty="0" err="1" smtClean="0"/>
               <a:t>InstanceInterruptionBehavior</a:t>
             </a:r>
             <a:r>
-              <a:rPr lang="en-US" sz="1100" dirty="0" smtClean="0"/>
+              <a:rPr lang="en-US" sz="1200" dirty="0" smtClean="0"/>
               <a:t>: “stop”</a:t>
             </a:r>
           </a:p>
@@ -11043,7 +11080,7 @@
               <a:buChar char="•"/>
             </a:pPr>
             <a:r>
-              <a:rPr lang="en-US" sz="1100" dirty="0" smtClean="0"/>
+              <a:rPr lang="en-US" sz="1200" dirty="0" smtClean="0"/>
               <a:t>Type: “maintain”</a:t>
             </a:r>
           </a:p>
@@ -11053,19 +11090,19 @@
               <a:buChar char="•"/>
             </a:pPr>
             <a:r>
-              <a:rPr lang="en-US" sz="1100" dirty="0" err="1" smtClean="0"/>
+              <a:rPr lang="en-US" sz="1200" dirty="0" err="1" smtClean="0"/>
               <a:t>ImageId</a:t>
             </a:r>
             <a:r>
-              <a:rPr lang="en-US" sz="1100" dirty="0" smtClean="0"/>
+              <a:rPr lang="en-US" sz="1200" dirty="0" smtClean="0"/>
               <a:t>: “your </a:t>
             </a:r>
             <a:r>
-              <a:rPr lang="en-US" sz="1100" dirty="0" err="1" smtClean="0"/>
+              <a:rPr lang="en-US" sz="1200" dirty="0" err="1" smtClean="0"/>
               <a:t>ami</a:t>
             </a:r>
             <a:r>
-              <a:rPr lang="en-US" sz="1100" dirty="0" smtClean="0"/>
+              <a:rPr lang="en-US" sz="1200" dirty="0" smtClean="0"/>
               <a:t>-id”</a:t>
             </a:r>
           </a:p>
@@ -11075,11 +11112,11 @@
               <a:buChar char="•"/>
             </a:pPr>
             <a:r>
-              <a:rPr lang="en-US" sz="1100" dirty="0" err="1" smtClean="0"/>
+              <a:rPr lang="en-US" sz="1200" dirty="0" err="1" smtClean="0"/>
               <a:t>AssciatePublicIpAddress</a:t>
             </a:r>
             <a:r>
-              <a:rPr lang="en-US" sz="1100" dirty="0" smtClean="0"/>
+              <a:rPr lang="en-US" sz="1200" dirty="0" smtClean="0"/>
               <a:t>: true</a:t>
             </a:r>
           </a:p>
@@ -11089,26 +11126,34 @@
               <a:buChar char="•"/>
             </a:pPr>
             <a:r>
-              <a:rPr lang="en-US" sz="1100" dirty="0" smtClean="0"/>
+              <a:rPr lang="en-US" sz="1200" dirty="0" smtClean="0"/>
               <a:t>I started with AWS Deep Learning AMI Ubuntu, ami-405ade3a. See here for detail. </a:t>
             </a:r>
             <a:r>
-              <a:rPr lang="en-US" sz="1100" dirty="0"/>
-              <a:t>https://</a:t>
-            </a:r>
-            <a:r>
-              <a:rPr lang="en-US" sz="1100" dirty="0" err="1"/>
+              <a:rPr lang="en-US" sz="1200" dirty="0" smtClean="0"/>
+              <a:t>https</a:t>
+            </a:r>
+            <a:r>
+              <a:rPr lang="en-US" sz="1200" dirty="0"/>
+              <a:t>://</a:t>
+            </a:r>
+            <a:r>
+              <a:rPr lang="en-US" sz="1200" dirty="0" err="1"/>
               <a:t>aws.amazon.com</a:t>
             </a:r>
             <a:r>
-              <a:rPr lang="en-US" sz="1100" dirty="0"/>
+              <a:rPr lang="en-US" sz="1200" dirty="0"/>
               <a:t>/marketplace/pp/B077GCH38C. </a:t>
             </a:r>
             <a:r>
-              <a:rPr lang="en-US" sz="1100" dirty="0" smtClean="0"/>
-              <a:t>This AMI has all the deep learning tools and frameworks preloaded.</a:t>
-            </a:r>
-            <a:endParaRPr lang="en-US" sz="1100" dirty="0"/>
+              <a:rPr lang="en-US" sz="1200" dirty="0" smtClean="0"/>
+              <a:t>This AMI has all the deep learning tools and frameworks </a:t>
+            </a:r>
+            <a:r>
+              <a:rPr lang="en-US" sz="1200" dirty="0" smtClean="0"/>
+              <a:t>preloaded and updated monthly. Use the latest AMI.</a:t>
+            </a:r>
+            <a:endParaRPr lang="en-US" sz="1200" dirty="0"/>
           </a:p>
           <a:p>
             <a:pPr marL="285750" indent="-285750">

</xml_diff>